<commit_message>
Minimal working CLI and GUI.
</commit_message>
<xml_diff>
--- a/AutoExport.pptx
+++ b/AutoExport.pptx
@@ -9,7 +9,6 @@
     <p:sldId id="257" r:id="rId4"/>
     <p:sldId id="258" r:id="rId5"/>
     <p:sldId id="259" r:id="rId6"/>
-    <p:sldId id="260" r:id="rId7"/>
   </p:sldIdLst>
   <p:sldSz cx="9144000" cy="6858000" type="screen4x3"/>
   <p:notesSz cx="6858000" cy="9144000"/>
@@ -120,7 +119,7 @@
           <a:lstStyle/>
           <a:p>
             <a:r>
-              <a:t>Draw</a:t>
+              <a:t>Text</a:t>
             </a:r>
           </a:p>
         </p:txBody>
@@ -157,7 +156,7 @@
           <a:lstStyle/>
           <a:p>
             <a:r>
-              <a:t>Slide</a:t>
+              <a:t>Draw</a:t>
             </a:r>
           </a:p>
         </p:txBody>
@@ -171,43 +170,6 @@
 </file>
 
 <file path=ppt/slides/slide4.xml><?xml version="1.0" encoding="utf-8"?>
-<p:sld xmlns:p="http://schemas.openxmlformats.org/presentationml/2006/main" xmlns:a="http://schemas.openxmlformats.org/drawingml/2006/main" xmlns:r="http://schemas.openxmlformats.org/officeDocument/2006/relationships">
-  <p:cSld>
-    <p:spTree>
-      <p:nvGrpSpPr>
-        <p:cNvPr id="1" name=""/>
-        <p:cNvGrpSpPr/>
-        <p:nvPr/>
-      </p:nvGrpSpPr>
-      <p:grpSpPr>
-        <a:xfrm/>
-      </p:grpSpPr>
-      <p:sp>
-        <p:nvSpPr>
-          <p:cNvPr id="2" name="TextBox"/>
-          <p:cNvSpPr/>
-          <p:nvPr/>
-        </p:nvSpPr>
-        <p:spPr/>
-        <p:txBody>
-          <a:bodyPr/>
-          <a:lstStyle/>
-          <a:p>
-            <a:r>
-              <a:t>Text</a:t>
-            </a:r>
-          </a:p>
-        </p:txBody>
-      </p:sp>
-    </p:spTree>
-  </p:cSld>
-  <p:clrMapOvr>
-    <a:masterClrMapping/>
-  </p:clrMapOvr>
-</p:sld>
-</file>
-
-<file path=ppt/slides/slide5.xml><?xml version="1.0" encoding="utf-8"?>
 <p:sld xmlns:p="http://schemas.openxmlformats.org/presentationml/2006/main" xmlns:a="http://schemas.openxmlformats.org/drawingml/2006/main" xmlns:r="http://schemas.openxmlformats.org/officeDocument/2006/relationships">
   <p:cSld>
     <p:spTree>

</xml_diff>